<commit_message>
added first steps of Excercise 2
</commit_message>
<xml_diff>
--- a/Assignment IV/Img/AssignmentII-2.pptx
+++ b/Assignment IV/Img/AssignmentII-2.pptx
@@ -106,6 +106,11 @@
       </a:defRPr>
     </a:lvl9pPr>
   </p:defaultTextStyle>
+  <p:extLst>
+    <p:ext uri="{EFAFB233-063F-42B5-8137-9DF3F51BA10A}">
+      <p15:sldGuideLst xmlns:p15="http://schemas.microsoft.com/office/powerpoint/2012/main"/>
+    </p:ext>
+  </p:extLst>
 </p:presentation>
 </file>
 
@@ -6116,7 +6121,7 @@
           <p:nvPr>
             <p:extLst>
               <p:ext uri="{D42A27DB-BD31-4B8C-83A1-F6EECF244321}">
-                <p14:modId xmlns:p14="http://schemas.microsoft.com/office/powerpoint/2010/main" val="2586546895"/>
+                <p14:modId xmlns:p14="http://schemas.microsoft.com/office/powerpoint/2010/main" val="2545033769"/>
               </p:ext>
             </p:extLst>
           </p:nvPr>
@@ -6296,82 +6301,13 @@
                     </a:p>
                   </a:txBody>
                   <a:tcPr>
-                    <a:noFill/>
-                  </a:tcPr>
-                </a:tc>
-                <a:tc>
-                  <a:txBody>
-                    <a:bodyPr/>
-                    <a:lstStyle/>
-                    <a:p>
-                      <a:pPr algn="ctr"/>
-                      <a:endParaRPr lang="de-DE" dirty="0"/>
-                    </a:p>
-                  </a:txBody>
-                  <a:tcPr>
-                    <a:noFill/>
-                  </a:tcPr>
-                </a:tc>
-                <a:tc>
-                  <a:txBody>
-                    <a:bodyPr/>
-                    <a:lstStyle/>
-                    <a:p>
-                      <a:pPr algn="ctr"/>
-                      <a:endParaRPr lang="de-DE" dirty="0"/>
-                    </a:p>
-                  </a:txBody>
-                  <a:tcPr>
-                    <a:noFill/>
-                  </a:tcPr>
-                </a:tc>
-                <a:extLst>
-                  <a:ext uri="{0D108BD9-81ED-4DB2-BD59-A6C34878D82A}">
-                    <a16:rowId xmlns:a16="http://schemas.microsoft.com/office/drawing/2014/main" val="3637247113"/>
-                  </a:ext>
-                </a:extLst>
-              </a:tr>
-              <a:tr h="370840">
-                <a:tc>
-                  <a:txBody>
-                    <a:bodyPr/>
-                    <a:lstStyle/>
-                    <a:p>
-                      <a:r>
-                        <a:rPr lang="de-DE" dirty="0" smtClean="0">
-                          <a:solidFill>
-                            <a:schemeClr val="bg1"/>
-                          </a:solidFill>
-                        </a:rPr>
-                        <a:t>B</a:t>
-                      </a:r>
-                      <a:endParaRPr lang="de-DE" dirty="0">
-                        <a:solidFill>
-                          <a:schemeClr val="bg1"/>
-                        </a:solidFill>
-                      </a:endParaRPr>
-                    </a:p>
-                  </a:txBody>
-                  <a:tcPr>
                     <a:solidFill>
-                      <a:schemeClr val="accent1"/>
+                      <a:schemeClr val="tx1">
+                        <a:lumMod val="50000"/>
+                        <a:lumOff val="50000"/>
+                      </a:schemeClr>
                     </a:solidFill>
                   </a:tcPr>
-                </a:tc>
-                <a:tc>
-                  <a:txBody>
-                    <a:bodyPr/>
-                    <a:lstStyle/>
-                    <a:p>
-                      <a:pPr algn="ctr"/>
-                      <a:r>
-                        <a:rPr lang="de-DE" dirty="0" smtClean="0"/>
-                        <a:t>-2</a:t>
-                      </a:r>
-                      <a:endParaRPr lang="de-DE" dirty="0"/>
-                    </a:p>
-                  </a:txBody>
-                  <a:tcPr/>
                 </a:tc>
                 <a:tc>
                   <a:txBody>
@@ -6401,25 +6337,17 @@
                     </a:p>
                   </a:txBody>
                   <a:tcPr>
-                    <a:noFill/>
-                  </a:tcPr>
-                </a:tc>
-                <a:tc>
-                  <a:txBody>
-                    <a:bodyPr/>
-                    <a:lstStyle/>
-                    <a:p>
-                      <a:pPr algn="ctr"/>
-                      <a:endParaRPr lang="de-DE" dirty="0"/>
-                    </a:p>
-                  </a:txBody>
-                  <a:tcPr>
-                    <a:noFill/>
+                    <a:solidFill>
+                      <a:schemeClr val="tx1">
+                        <a:lumMod val="50000"/>
+                        <a:lumOff val="50000"/>
+                      </a:schemeClr>
+                    </a:solidFill>
                   </a:tcPr>
                 </a:tc>
                 <a:extLst>
                   <a:ext uri="{0D108BD9-81ED-4DB2-BD59-A6C34878D82A}">
-                    <a16:rowId xmlns:a16="http://schemas.microsoft.com/office/drawing/2014/main" val="1682205605"/>
+                    <a16:rowId xmlns:a16="http://schemas.microsoft.com/office/drawing/2014/main" val="3637247113"/>
                   </a:ext>
                 </a:extLst>
               </a:tr>
@@ -6435,7 +6363,7 @@
                             <a:schemeClr val="bg1"/>
                           </a:solidFill>
                         </a:rPr>
-                        <a:t>C</a:t>
+                        <a:t>B</a:t>
                       </a:r>
                       <a:endParaRPr lang="de-DE" dirty="0">
                         <a:solidFill>
@@ -6449,21 +6377,6 @@
                       <a:schemeClr val="accent1"/>
                     </a:solidFill>
                   </a:tcPr>
-                </a:tc>
-                <a:tc>
-                  <a:txBody>
-                    <a:bodyPr/>
-                    <a:lstStyle/>
-                    <a:p>
-                      <a:pPr algn="ctr"/>
-                      <a:r>
-                        <a:rPr lang="de-DE" dirty="0" smtClean="0"/>
-                        <a:t>2</a:t>
-                      </a:r>
-                      <a:endParaRPr lang="de-DE" dirty="0"/>
-                    </a:p>
-                  </a:txBody>
-                  <a:tcPr/>
                 </a:tc>
                 <a:tc>
                   <a:txBody>
@@ -6508,7 +6421,129 @@
                     </a:p>
                   </a:txBody>
                   <a:tcPr>
-                    <a:noFill/>
+                    <a:solidFill>
+                      <a:schemeClr val="tx1">
+                        <a:lumMod val="50000"/>
+                        <a:lumOff val="50000"/>
+                      </a:schemeClr>
+                    </a:solidFill>
+                  </a:tcPr>
+                </a:tc>
+                <a:tc>
+                  <a:txBody>
+                    <a:bodyPr/>
+                    <a:lstStyle/>
+                    <a:p>
+                      <a:pPr algn="ctr"/>
+                      <a:endParaRPr lang="de-DE" dirty="0"/>
+                    </a:p>
+                  </a:txBody>
+                  <a:tcPr>
+                    <a:solidFill>
+                      <a:schemeClr val="tx1">
+                        <a:lumMod val="50000"/>
+                        <a:lumOff val="50000"/>
+                      </a:schemeClr>
+                    </a:solidFill>
+                  </a:tcPr>
+                </a:tc>
+                <a:extLst>
+                  <a:ext uri="{0D108BD9-81ED-4DB2-BD59-A6C34878D82A}">
+                    <a16:rowId xmlns:a16="http://schemas.microsoft.com/office/drawing/2014/main" val="1682205605"/>
+                  </a:ext>
+                </a:extLst>
+              </a:tr>
+              <a:tr h="370840">
+                <a:tc>
+                  <a:txBody>
+                    <a:bodyPr/>
+                    <a:lstStyle/>
+                    <a:p>
+                      <a:r>
+                        <a:rPr lang="de-DE" dirty="0" smtClean="0">
+                          <a:solidFill>
+                            <a:schemeClr val="bg1"/>
+                          </a:solidFill>
+                        </a:rPr>
+                        <a:t>C</a:t>
+                      </a:r>
+                      <a:endParaRPr lang="de-DE" dirty="0">
+                        <a:solidFill>
+                          <a:schemeClr val="bg1"/>
+                        </a:solidFill>
+                      </a:endParaRPr>
+                    </a:p>
+                  </a:txBody>
+                  <a:tcPr>
+                    <a:solidFill>
+                      <a:schemeClr val="accent1"/>
+                    </a:solidFill>
+                  </a:tcPr>
+                </a:tc>
+                <a:tc>
+                  <a:txBody>
+                    <a:bodyPr/>
+                    <a:lstStyle/>
+                    <a:p>
+                      <a:pPr algn="ctr"/>
+                      <a:r>
+                        <a:rPr lang="de-DE" dirty="0" smtClean="0"/>
+                        <a:t>2</a:t>
+                      </a:r>
+                      <a:endParaRPr lang="de-DE" dirty="0"/>
+                    </a:p>
+                  </a:txBody>
+                  <a:tcPr/>
+                </a:tc>
+                <a:tc>
+                  <a:txBody>
+                    <a:bodyPr/>
+                    <a:lstStyle/>
+                    <a:p>
+                      <a:pPr algn="ctr"/>
+                      <a:r>
+                        <a:rPr lang="de-DE" dirty="0" smtClean="0"/>
+                        <a:t>-2</a:t>
+                      </a:r>
+                      <a:endParaRPr lang="de-DE" dirty="0"/>
+                    </a:p>
+                  </a:txBody>
+                  <a:tcPr/>
+                </a:tc>
+                <a:tc>
+                  <a:txBody>
+                    <a:bodyPr/>
+                    <a:lstStyle/>
+                    <a:p>
+                      <a:pPr algn="ctr"/>
+                      <a:endParaRPr lang="de-DE" dirty="0"/>
+                    </a:p>
+                  </a:txBody>
+                  <a:tcPr>
+                    <a:solidFill>
+                      <a:schemeClr val="tx1">
+                        <a:lumMod val="50000"/>
+                        <a:lumOff val="50000"/>
+                      </a:schemeClr>
+                    </a:solidFill>
+                  </a:tcPr>
+                </a:tc>
+                <a:tc>
+                  <a:txBody>
+                    <a:bodyPr/>
+                    <a:lstStyle/>
+                    <a:p>
+                      <a:pPr algn="ctr"/>
+                      <a:endParaRPr lang="de-DE" dirty="0"/>
+                    </a:p>
+                  </a:txBody>
+                  <a:tcPr>
+                    <a:solidFill>
+                      <a:schemeClr val="tx1">
+                        <a:lumMod val="50000"/>
+                        <a:lumOff val="50000"/>
+                      </a:schemeClr>
+                    </a:solidFill>
                   </a:tcPr>
                 </a:tc>
                 <a:extLst>

</xml_diff>